<commit_message>
some changes; update ppt
</commit_message>
<xml_diff>
--- a/docs/Rubiks Cube Solver.pptx
+++ b/docs/Rubiks Cube Solver.pptx
@@ -5,16 +5,18 @@
     <p:sldMasterId id="2147483677" r:id="rId1"/>
   </p:sldMasterIdLst>
   <p:notesMasterIdLst>
-    <p:notesMasterId r:id="rId9"/>
+    <p:notesMasterId r:id="rId11"/>
   </p:notesMasterIdLst>
   <p:sldIdLst>
     <p:sldId id="256" r:id="rId2"/>
     <p:sldId id="273" r:id="rId3"/>
     <p:sldId id="280" r:id="rId4"/>
     <p:sldId id="276" r:id="rId5"/>
-    <p:sldId id="277" r:id="rId6"/>
-    <p:sldId id="279" r:id="rId7"/>
-    <p:sldId id="275" r:id="rId8"/>
+    <p:sldId id="282" r:id="rId6"/>
+    <p:sldId id="281" r:id="rId7"/>
+    <p:sldId id="277" r:id="rId8"/>
+    <p:sldId id="279" r:id="rId9"/>
+    <p:sldId id="275" r:id="rId10"/>
   </p:sldIdLst>
   <p:sldSz cx="9144000" cy="5143500" type="screen16x9"/>
   <p:notesSz cx="6858000" cy="9144000"/>
@@ -915,6 +917,14 @@
           <a:bodyPr/>
           <a:lstStyle/>
           <a:p>
+            <a:pPr marL="457200" indent="-298450" algn="just">
+              <a:buFont typeface="Arial" panose="020B0604020202020204" pitchFamily="34" charset="0"/>
+              <a:buChar char="•"/>
+            </a:pPr>
+            <a:r>
+              <a:rPr lang="en-US" dirty="0"/>
+              <a:t>The code splits the input frame into Red, Green, and Blue color channels, calculates average values, determines a reference value, scales each channel's intensity, and merges them to create a balanced image.</a:t>
+            </a:r>
             <a:endParaRPr lang="pt-PT" dirty="0"/>
           </a:p>
         </p:txBody>
@@ -1015,16 +1025,74 @@
           </a:bodyPr>
           <a:lstStyle/>
           <a:p>
-            <a:pPr marL="0" lvl="0" indent="0" algn="l" rtl="0">
+            <a:pPr marL="171450" indent="-171450">
+              <a:buFont typeface="Arial" panose="020B0604020202020204" pitchFamily="34" charset="0"/>
+              <a:buChar char="•"/>
+            </a:pPr>
+            <a:r>
+              <a:rPr lang="en-US" sz="1100" dirty="0"/>
+              <a:t>First, we made each color of the Rubik's cube have a </a:t>
+            </a:r>
+            <a:r>
+              <a:rPr lang="en-US" sz="1100" b="1" dirty="0"/>
+              <a:t>color range </a:t>
+            </a:r>
+            <a:r>
+              <a:rPr lang="en-US" sz="1100" dirty="0"/>
+              <a:t>in the </a:t>
+            </a:r>
+            <a:r>
+              <a:rPr lang="en-US" sz="1100" b="1" dirty="0"/>
+              <a:t>HSV</a:t>
+            </a:r>
+            <a:r>
+              <a:rPr lang="en-US" sz="1100" dirty="0"/>
+              <a:t> format (Fig. 1), which the program used to isolate the regions of the image most likely to contain Rubik's cube stickers of the desired color and produce a </a:t>
+            </a:r>
+            <a:r>
+              <a:rPr lang="en-US" sz="1100" b="1" dirty="0"/>
+              <a:t>mask</a:t>
+            </a:r>
+            <a:r>
+              <a:rPr lang="en-US" sz="1100" dirty="0"/>
+              <a:t> for each color.</a:t>
+            </a:r>
+          </a:p>
+          <a:p>
+            <a:pPr marL="171450" indent="-171450">
+              <a:buFont typeface="Arial" panose="020B0604020202020204" pitchFamily="34" charset="0"/>
+              <a:buChar char="•"/>
+            </a:pPr>
+            <a:endParaRPr lang="en-US" sz="1100" dirty="0"/>
+          </a:p>
+          <a:p>
+            <a:pPr marL="171450" marR="0" lvl="0" indent="-171450" algn="l" defTabSz="914400" rtl="0" eaLnBrk="1" fontAlgn="auto" latinLnBrk="0" hangingPunct="1">
+              <a:lnSpc>
+                <a:spcPct val="100000"/>
+              </a:lnSpc>
               <a:spcBef>
                 <a:spcPts val="0"/>
               </a:spcBef>
               <a:spcAft>
                 <a:spcPts val="0"/>
               </a:spcAft>
-              <a:buNone/>
+              <a:buClr>
+                <a:srgbClr val="000000"/>
+              </a:buClr>
+              <a:buSzPts val="1100"/>
+              <a:buFont typeface="Arial" panose="020B0604020202020204" pitchFamily="34" charset="0"/>
+              <a:buChar char="•"/>
+              <a:tabLst/>
+              <a:defRPr/>
             </a:pPr>
-            <a:endParaRPr/>
+            <a:r>
+              <a:rPr lang="en-US" sz="1100" b="1" dirty="0"/>
+              <a:t>Note: </a:t>
+            </a:r>
+            <a:r>
+              <a:rPr lang="en-US" sz="1100" dirty="0"/>
+              <a:t>In Fig.1, the ranges represent the acceptable color values for detecting each face in an environment controlled by us. The values may vary due to different lighting conditions. </a:t>
+            </a:r>
           </a:p>
         </p:txBody>
       </p:sp>
@@ -1042,6 +1110,740 @@
 </file>
 
 <file path=ppt/notesSlides/notesSlide5.xml><?xml version="1.0" encoding="utf-8"?>
+<p:notes xmlns:a="http://schemas.openxmlformats.org/drawingml/2006/main" xmlns:r="http://schemas.openxmlformats.org/officeDocument/2006/relationships" xmlns:p="http://schemas.openxmlformats.org/presentationml/2006/main" showMasterSp="0" showMasterPhAnim="0">
+  <p:cSld>
+    <p:spTree>
+      <p:nvGrpSpPr>
+        <p:cNvPr id="1" name="Shape 866"/>
+        <p:cNvGrpSpPr/>
+        <p:nvPr/>
+      </p:nvGrpSpPr>
+      <p:grpSpPr>
+        <a:xfrm>
+          <a:off x="0" y="0"/>
+          <a:ext cx="0" cy="0"/>
+          <a:chOff x="0" y="0"/>
+          <a:chExt cx="0" cy="0"/>
+        </a:xfrm>
+      </p:grpSpPr>
+      <p:sp>
+        <p:nvSpPr>
+          <p:cNvPr id="867" name="Google Shape;867;g5417505d66_0_2111:notes"/>
+          <p:cNvSpPr>
+            <a:spLocks noGrp="1" noRot="1" noChangeAspect="1"/>
+          </p:cNvSpPr>
+          <p:nvPr>
+            <p:ph type="sldImg" idx="2"/>
+          </p:nvPr>
+        </p:nvSpPr>
+        <p:spPr>
+          <a:xfrm>
+            <a:off x="381000" y="685800"/>
+            <a:ext cx="6096000" cy="3429000"/>
+          </a:xfrm>
+          <a:custGeom>
+            <a:avLst/>
+            <a:gdLst/>
+            <a:ahLst/>
+            <a:cxnLst/>
+            <a:rect l="l" t="t" r="r" b="b"/>
+            <a:pathLst>
+              <a:path w="120000" h="120000" extrusionOk="0">
+                <a:moveTo>
+                  <a:pt x="0" y="0"/>
+                </a:moveTo>
+                <a:lnTo>
+                  <a:pt x="120000" y="0"/>
+                </a:lnTo>
+                <a:lnTo>
+                  <a:pt x="120000" y="120000"/>
+                </a:lnTo>
+                <a:lnTo>
+                  <a:pt x="0" y="120000"/>
+                </a:lnTo>
+                <a:close/>
+              </a:path>
+            </a:pathLst>
+          </a:custGeom>
+        </p:spPr>
+      </p:sp>
+      <p:sp>
+        <p:nvSpPr>
+          <p:cNvPr id="868" name="Google Shape;868;g5417505d66_0_2111:notes"/>
+          <p:cNvSpPr txBox="1">
+            <a:spLocks noGrp="1"/>
+          </p:cNvSpPr>
+          <p:nvPr>
+            <p:ph type="body" idx="1"/>
+          </p:nvPr>
+        </p:nvSpPr>
+        <p:spPr>
+          <a:xfrm>
+            <a:off x="685800" y="4343400"/>
+            <a:ext cx="5486400" cy="4114800"/>
+          </a:xfrm>
+          <a:prstGeom prst="rect">
+            <a:avLst/>
+          </a:prstGeom>
+        </p:spPr>
+        <p:txBody>
+          <a:bodyPr spcFirstLastPara="1" wrap="square" lIns="91425" tIns="91425" rIns="91425" bIns="91425" anchor="t" anchorCtr="0">
+            <a:noAutofit/>
+          </a:bodyPr>
+          <a:lstStyle/>
+          <a:p>
+            <a:pPr marL="0" lvl="0" indent="0" algn="l" rtl="0">
+              <a:spcBef>
+                <a:spcPts val="0"/>
+              </a:spcBef>
+              <a:spcAft>
+                <a:spcPts val="0"/>
+              </a:spcAft>
+              <a:buNone/>
+            </a:pPr>
+            <a:r>
+              <a:rPr lang="pt-PT" dirty="0"/>
+              <a:t>L – </a:t>
+            </a:r>
+            <a:r>
+              <a:rPr lang="pt-PT" dirty="0" err="1"/>
+              <a:t>lightness</a:t>
+            </a:r>
+            <a:endParaRPr lang="pt-PT" dirty="0"/>
+          </a:p>
+          <a:p>
+            <a:pPr marL="0" lvl="0" indent="0" algn="l" rtl="0">
+              <a:spcBef>
+                <a:spcPts val="0"/>
+              </a:spcBef>
+              <a:spcAft>
+                <a:spcPts val="0"/>
+              </a:spcAft>
+              <a:buNone/>
+            </a:pPr>
+            <a:r>
+              <a:rPr lang="pt-PT" dirty="0"/>
+              <a:t>a – </a:t>
+            </a:r>
+            <a:r>
+              <a:rPr lang="pt-PT" dirty="0" err="1"/>
+              <a:t>spectrum</a:t>
+            </a:r>
+            <a:r>
+              <a:rPr lang="pt-PT" dirty="0"/>
+              <a:t> </a:t>
+            </a:r>
+            <a:r>
+              <a:rPr lang="pt-PT" dirty="0" err="1"/>
+              <a:t>from</a:t>
+            </a:r>
+            <a:r>
+              <a:rPr lang="pt-PT" dirty="0"/>
+              <a:t> green to </a:t>
+            </a:r>
+            <a:r>
+              <a:rPr lang="pt-PT" dirty="0" err="1"/>
+              <a:t>red</a:t>
+            </a:r>
+            <a:endParaRPr lang="pt-PT" dirty="0"/>
+          </a:p>
+          <a:p>
+            <a:pPr marL="0" lvl="0" indent="0" algn="l" rtl="0">
+              <a:spcBef>
+                <a:spcPts val="0"/>
+              </a:spcBef>
+              <a:spcAft>
+                <a:spcPts val="0"/>
+              </a:spcAft>
+              <a:buNone/>
+            </a:pPr>
+            <a:r>
+              <a:rPr lang="pt-PT" dirty="0"/>
+              <a:t>b – </a:t>
+            </a:r>
+            <a:r>
+              <a:rPr lang="pt-PT" dirty="0" err="1"/>
+              <a:t>spectrum</a:t>
+            </a:r>
+            <a:r>
+              <a:rPr lang="pt-PT" dirty="0"/>
+              <a:t> </a:t>
+            </a:r>
+            <a:r>
+              <a:rPr lang="pt-PT" dirty="0" err="1"/>
+              <a:t>from</a:t>
+            </a:r>
+            <a:r>
+              <a:rPr lang="pt-PT" dirty="0"/>
+              <a:t> </a:t>
+            </a:r>
+            <a:r>
+              <a:rPr lang="pt-PT" dirty="0" err="1"/>
+              <a:t>blue</a:t>
+            </a:r>
+            <a:r>
+              <a:rPr lang="pt-PT" dirty="0"/>
+              <a:t> to </a:t>
+            </a:r>
+            <a:r>
+              <a:rPr lang="pt-PT" dirty="0" err="1"/>
+              <a:t>yellow</a:t>
+            </a:r>
+            <a:endParaRPr dirty="0"/>
+          </a:p>
+        </p:txBody>
+      </p:sp>
+    </p:spTree>
+    <p:extLst>
+      <p:ext uri="{BB962C8B-B14F-4D97-AF65-F5344CB8AC3E}">
+        <p14:creationId xmlns:p14="http://schemas.microsoft.com/office/powerpoint/2010/main" val="4135897648"/>
+      </p:ext>
+    </p:extLst>
+  </p:cSld>
+  <p:clrMapOvr>
+    <a:masterClrMapping/>
+  </p:clrMapOvr>
+</p:notes>
+</file>
+
+<file path=ppt/notesSlides/notesSlide6.xml><?xml version="1.0" encoding="utf-8"?>
+<p:notes xmlns:a="http://schemas.openxmlformats.org/drawingml/2006/main" xmlns:r="http://schemas.openxmlformats.org/officeDocument/2006/relationships" xmlns:p="http://schemas.openxmlformats.org/presentationml/2006/main" showMasterSp="0" showMasterPhAnim="0">
+  <p:cSld>
+    <p:spTree>
+      <p:nvGrpSpPr>
+        <p:cNvPr id="1" name="Shape 866"/>
+        <p:cNvGrpSpPr/>
+        <p:nvPr/>
+      </p:nvGrpSpPr>
+      <p:grpSpPr>
+        <a:xfrm>
+          <a:off x="0" y="0"/>
+          <a:ext cx="0" cy="0"/>
+          <a:chOff x="0" y="0"/>
+          <a:chExt cx="0" cy="0"/>
+        </a:xfrm>
+      </p:grpSpPr>
+      <p:sp>
+        <p:nvSpPr>
+          <p:cNvPr id="867" name="Google Shape;867;g5417505d66_0_2111:notes"/>
+          <p:cNvSpPr>
+            <a:spLocks noGrp="1" noRot="1" noChangeAspect="1"/>
+          </p:cNvSpPr>
+          <p:nvPr>
+            <p:ph type="sldImg" idx="2"/>
+          </p:nvPr>
+        </p:nvSpPr>
+        <p:spPr>
+          <a:xfrm>
+            <a:off x="381000" y="685800"/>
+            <a:ext cx="6096000" cy="3429000"/>
+          </a:xfrm>
+          <a:custGeom>
+            <a:avLst/>
+            <a:gdLst/>
+            <a:ahLst/>
+            <a:cxnLst/>
+            <a:rect l="l" t="t" r="r" b="b"/>
+            <a:pathLst>
+              <a:path w="120000" h="120000" extrusionOk="0">
+                <a:moveTo>
+                  <a:pt x="0" y="0"/>
+                </a:moveTo>
+                <a:lnTo>
+                  <a:pt x="120000" y="0"/>
+                </a:lnTo>
+                <a:lnTo>
+                  <a:pt x="120000" y="120000"/>
+                </a:lnTo>
+                <a:lnTo>
+                  <a:pt x="0" y="120000"/>
+                </a:lnTo>
+                <a:close/>
+              </a:path>
+            </a:pathLst>
+          </a:custGeom>
+        </p:spPr>
+      </p:sp>
+      <p:sp>
+        <p:nvSpPr>
+          <p:cNvPr id="868" name="Google Shape;868;g5417505d66_0_2111:notes"/>
+          <p:cNvSpPr txBox="1">
+            <a:spLocks noGrp="1"/>
+          </p:cNvSpPr>
+          <p:nvPr>
+            <p:ph type="body" idx="1"/>
+          </p:nvPr>
+        </p:nvSpPr>
+        <p:spPr>
+          <a:xfrm>
+            <a:off x="685800" y="4343400"/>
+            <a:ext cx="5486400" cy="4114800"/>
+          </a:xfrm>
+          <a:prstGeom prst="rect">
+            <a:avLst/>
+          </a:prstGeom>
+        </p:spPr>
+        <p:txBody>
+          <a:bodyPr spcFirstLastPara="1" wrap="square" lIns="91425" tIns="91425" rIns="91425" bIns="91425" anchor="t" anchorCtr="0">
+            <a:noAutofit/>
+          </a:bodyPr>
+          <a:lstStyle/>
+          <a:p>
+            <a:pPr marL="171450" marR="0" lvl="0" indent="-171450" algn="l" defTabSz="914400" rtl="0" eaLnBrk="1" fontAlgn="auto" latinLnBrk="0" hangingPunct="1">
+              <a:lnSpc>
+                <a:spcPct val="100000"/>
+              </a:lnSpc>
+              <a:spcBef>
+                <a:spcPts val="0"/>
+              </a:spcBef>
+              <a:spcAft>
+                <a:spcPts val="0"/>
+              </a:spcAft>
+              <a:buClr>
+                <a:srgbClr val="000000"/>
+              </a:buClr>
+              <a:buSzPts val="1100"/>
+              <a:buFont typeface="Arial" panose="020B0604020202020204" pitchFamily="34" charset="0"/>
+              <a:buChar char="•"/>
+              <a:tabLst/>
+              <a:defRPr/>
+            </a:pPr>
+            <a:r>
+              <a:rPr lang="en-US" sz="1100" dirty="0"/>
+              <a:t>To improve the accuracy of color detection, additional image processing techniques were applied to the mask, such as </a:t>
+            </a:r>
+            <a:r>
+              <a:rPr lang="en-US" sz="1100" b="1" dirty="0"/>
+              <a:t>Gaussian blur</a:t>
+            </a:r>
+            <a:r>
+              <a:rPr lang="en-US" sz="1100" dirty="0"/>
+              <a:t>, </a:t>
+            </a:r>
+            <a:r>
+              <a:rPr lang="en-US" sz="1100" b="1" dirty="0"/>
+              <a:t>morphological operations</a:t>
+            </a:r>
+            <a:r>
+              <a:rPr lang="en-US" sz="1100" dirty="0"/>
+              <a:t>, and </a:t>
+            </a:r>
+            <a:r>
+              <a:rPr lang="en-US" sz="1100" b="1" dirty="0"/>
+              <a:t>edge detection</a:t>
+            </a:r>
+            <a:r>
+              <a:rPr lang="en-US" sz="1100" dirty="0"/>
+              <a:t>.</a:t>
+            </a:r>
+          </a:p>
+          <a:p>
+            <a:pPr marL="171450" marR="0" lvl="0" indent="-171450" algn="l" defTabSz="914400" rtl="0" eaLnBrk="1" fontAlgn="auto" latinLnBrk="0" hangingPunct="1">
+              <a:lnSpc>
+                <a:spcPct val="100000"/>
+              </a:lnSpc>
+              <a:spcBef>
+                <a:spcPts val="0"/>
+              </a:spcBef>
+              <a:spcAft>
+                <a:spcPts val="0"/>
+              </a:spcAft>
+              <a:buClr>
+                <a:srgbClr val="000000"/>
+              </a:buClr>
+              <a:buSzPts val="1100"/>
+              <a:buFont typeface="Arial" panose="020B0604020202020204" pitchFamily="34" charset="0"/>
+              <a:buChar char="•"/>
+              <a:tabLst/>
+              <a:defRPr/>
+            </a:pPr>
+            <a:endParaRPr lang="en-US" b="1" i="0" dirty="0">
+              <a:effectLst/>
+              <a:latin typeface="Söhne"/>
+            </a:endParaRPr>
+          </a:p>
+          <a:p>
+            <a:pPr marL="171450" marR="0" lvl="0" indent="-171450" algn="l" defTabSz="914400" rtl="0" eaLnBrk="1" fontAlgn="auto" latinLnBrk="0" hangingPunct="1">
+              <a:lnSpc>
+                <a:spcPct val="100000"/>
+              </a:lnSpc>
+              <a:spcBef>
+                <a:spcPts val="0"/>
+              </a:spcBef>
+              <a:spcAft>
+                <a:spcPts val="0"/>
+              </a:spcAft>
+              <a:buClr>
+                <a:srgbClr val="000000"/>
+              </a:buClr>
+              <a:buSzPts val="1100"/>
+              <a:buFont typeface="Arial" panose="020B0604020202020204" pitchFamily="34" charset="0"/>
+              <a:buChar char="•"/>
+              <a:tabLst/>
+              <a:defRPr/>
+            </a:pPr>
+            <a:r>
+              <a:rPr lang="en-US" b="1" i="0" dirty="0">
+                <a:effectLst/>
+                <a:latin typeface="Söhne"/>
+              </a:rPr>
+              <a:t>Gaussian Blur</a:t>
+            </a:r>
+            <a:r>
+              <a:rPr lang="en-US" b="0" i="0" dirty="0">
+                <a:solidFill>
+                  <a:srgbClr val="D1D5DB"/>
+                </a:solidFill>
+                <a:effectLst/>
+                <a:latin typeface="Söhne"/>
+              </a:rPr>
+              <a:t>: Applied to reduce noise and smoothen the image. It's useful before edge detection to minimize high-frequency components.</a:t>
+            </a:r>
+          </a:p>
+          <a:p>
+            <a:pPr marL="171450" marR="0" lvl="0" indent="-171450" algn="l" defTabSz="914400" rtl="0" eaLnBrk="1" fontAlgn="auto" latinLnBrk="0" hangingPunct="1">
+              <a:lnSpc>
+                <a:spcPct val="100000"/>
+              </a:lnSpc>
+              <a:spcBef>
+                <a:spcPts val="0"/>
+              </a:spcBef>
+              <a:spcAft>
+                <a:spcPts val="0"/>
+              </a:spcAft>
+              <a:buClr>
+                <a:srgbClr val="000000"/>
+              </a:buClr>
+              <a:buSzPts val="1100"/>
+              <a:buFont typeface="Arial" panose="020B0604020202020204" pitchFamily="34" charset="0"/>
+              <a:buChar char="•"/>
+              <a:tabLst/>
+              <a:defRPr/>
+            </a:pPr>
+            <a:endParaRPr lang="en-US" b="0" i="0" dirty="0">
+              <a:solidFill>
+                <a:srgbClr val="D1D5DB"/>
+              </a:solidFill>
+              <a:effectLst/>
+              <a:latin typeface="Söhne"/>
+            </a:endParaRPr>
+          </a:p>
+          <a:p>
+            <a:pPr marL="171450" marR="0" lvl="0" indent="-171450" algn="l" defTabSz="914400" rtl="0" eaLnBrk="1" fontAlgn="auto" latinLnBrk="0" hangingPunct="1">
+              <a:lnSpc>
+                <a:spcPct val="100000"/>
+              </a:lnSpc>
+              <a:spcBef>
+                <a:spcPts val="0"/>
+              </a:spcBef>
+              <a:spcAft>
+                <a:spcPts val="0"/>
+              </a:spcAft>
+              <a:buClr>
+                <a:srgbClr val="000000"/>
+              </a:buClr>
+              <a:buSzPts val="1100"/>
+              <a:buFont typeface="Arial" panose="020B0604020202020204" pitchFamily="34" charset="0"/>
+              <a:buChar char="•"/>
+              <a:tabLst/>
+              <a:defRPr/>
+            </a:pPr>
+            <a:r>
+              <a:rPr lang="en-US" b="1" dirty="0"/>
+              <a:t>cv2.morphologyEx</a:t>
+            </a:r>
+            <a:r>
+              <a:rPr lang="en-US" b="1" i="0" dirty="0">
+                <a:solidFill>
+                  <a:srgbClr val="D1D5DB"/>
+                </a:solidFill>
+                <a:effectLst/>
+                <a:latin typeface="Söhne"/>
+              </a:rPr>
+              <a:t> </a:t>
+            </a:r>
+            <a:r>
+              <a:rPr lang="en-US" b="0" i="0" dirty="0">
+                <a:solidFill>
+                  <a:srgbClr val="D1D5DB"/>
+                </a:solidFill>
+                <a:effectLst/>
+                <a:latin typeface="Söhne"/>
+              </a:rPr>
+              <a:t>is used for:</a:t>
+            </a:r>
+          </a:p>
+          <a:p>
+            <a:pPr marL="0" marR="0" lvl="0" indent="0" algn="l" defTabSz="914400" rtl="0" eaLnBrk="1" fontAlgn="auto" latinLnBrk="0" hangingPunct="1">
+              <a:lnSpc>
+                <a:spcPct val="100000"/>
+              </a:lnSpc>
+              <a:spcBef>
+                <a:spcPts val="0"/>
+              </a:spcBef>
+              <a:spcAft>
+                <a:spcPts val="0"/>
+              </a:spcAft>
+              <a:buClr>
+                <a:srgbClr val="000000"/>
+              </a:buClr>
+              <a:buSzPts val="1100"/>
+              <a:buFont typeface="Arial" panose="020B0604020202020204" pitchFamily="34" charset="0"/>
+              <a:buNone/>
+              <a:tabLst/>
+              <a:defRPr/>
+            </a:pPr>
+            <a:r>
+              <a:rPr lang="en-US" b="0" i="0" dirty="0">
+                <a:solidFill>
+                  <a:srgbClr val="D1D5DB"/>
+                </a:solidFill>
+                <a:effectLst/>
+                <a:latin typeface="Söhne"/>
+              </a:rPr>
+              <a:t>	opening (erosion followed by dilation): helps to remove objects or noise from the foreground (bright regions)</a:t>
+            </a:r>
+          </a:p>
+          <a:p>
+            <a:pPr marL="0" marR="0" lvl="0" indent="0" algn="l" defTabSz="914400" rtl="0" eaLnBrk="1" fontAlgn="auto" latinLnBrk="0" hangingPunct="1">
+              <a:lnSpc>
+                <a:spcPct val="100000"/>
+              </a:lnSpc>
+              <a:spcBef>
+                <a:spcPts val="0"/>
+              </a:spcBef>
+              <a:spcAft>
+                <a:spcPts val="0"/>
+              </a:spcAft>
+              <a:buClr>
+                <a:srgbClr val="000000"/>
+              </a:buClr>
+              <a:buSzPts val="1100"/>
+              <a:buFont typeface="Arial" panose="020B0604020202020204" pitchFamily="34" charset="0"/>
+              <a:buNone/>
+              <a:tabLst/>
+              <a:defRPr/>
+            </a:pPr>
+            <a:r>
+              <a:rPr lang="en-US" b="0" i="0" dirty="0">
+                <a:solidFill>
+                  <a:srgbClr val="D1D5DB"/>
+                </a:solidFill>
+                <a:effectLst/>
+                <a:latin typeface="Söhne"/>
+              </a:rPr>
+              <a:t>	closing (dilation followed by erosion): helps to close small holes or gaps in the foreground</a:t>
+            </a:r>
+          </a:p>
+          <a:p>
+            <a:pPr marL="171450" marR="0" lvl="0" indent="-171450" algn="l" defTabSz="914400" rtl="0" eaLnBrk="1" fontAlgn="auto" latinLnBrk="0" hangingPunct="1">
+              <a:lnSpc>
+                <a:spcPct val="100000"/>
+              </a:lnSpc>
+              <a:spcBef>
+                <a:spcPts val="0"/>
+              </a:spcBef>
+              <a:spcAft>
+                <a:spcPts val="0"/>
+              </a:spcAft>
+              <a:buClr>
+                <a:srgbClr val="000000"/>
+              </a:buClr>
+              <a:buSzPts val="1100"/>
+              <a:buFont typeface="Arial" panose="020B0604020202020204" pitchFamily="34" charset="0"/>
+              <a:buChar char="•"/>
+              <a:tabLst/>
+              <a:defRPr/>
+            </a:pPr>
+            <a:endParaRPr lang="en-US" sz="1100" b="0" i="0" dirty="0">
+              <a:solidFill>
+                <a:srgbClr val="D1D5DB"/>
+              </a:solidFill>
+              <a:effectLst/>
+              <a:latin typeface="Söhne"/>
+            </a:endParaRPr>
+          </a:p>
+          <a:p>
+            <a:pPr marL="171450" marR="0" lvl="0" indent="-171450" algn="l" defTabSz="914400" rtl="0" eaLnBrk="1" fontAlgn="auto" latinLnBrk="0" hangingPunct="1">
+              <a:lnSpc>
+                <a:spcPct val="100000"/>
+              </a:lnSpc>
+              <a:spcBef>
+                <a:spcPts val="0"/>
+              </a:spcBef>
+              <a:spcAft>
+                <a:spcPts val="0"/>
+              </a:spcAft>
+              <a:buClr>
+                <a:srgbClr val="000000"/>
+              </a:buClr>
+              <a:buSzPts val="1100"/>
+              <a:buFont typeface="Arial" panose="020B0604020202020204" pitchFamily="34" charset="0"/>
+              <a:buChar char="•"/>
+              <a:tabLst/>
+              <a:defRPr/>
+            </a:pPr>
+            <a:r>
+              <a:rPr lang="en-US" b="0" i="0" dirty="0">
+                <a:solidFill>
+                  <a:srgbClr val="D1D5DB"/>
+                </a:solidFill>
+                <a:effectLst/>
+                <a:latin typeface="Söhne"/>
+              </a:rPr>
+              <a:t>The </a:t>
+            </a:r>
+            <a:r>
+              <a:rPr lang="en-US" b="1" dirty="0"/>
+              <a:t>cv2.Canny</a:t>
+            </a:r>
+            <a:r>
+              <a:rPr lang="en-US" b="1" i="0" dirty="0">
+                <a:solidFill>
+                  <a:srgbClr val="D1D5DB"/>
+                </a:solidFill>
+                <a:effectLst/>
+                <a:latin typeface="Söhne"/>
+              </a:rPr>
+              <a:t> </a:t>
+            </a:r>
+            <a:r>
+              <a:rPr lang="en-US" b="0" i="0" dirty="0">
+                <a:solidFill>
+                  <a:srgbClr val="D1D5DB"/>
+                </a:solidFill>
+                <a:effectLst/>
+                <a:latin typeface="Söhne"/>
+              </a:rPr>
+              <a:t>function is used to detect edges in the frame.</a:t>
+            </a:r>
+            <a:endParaRPr lang="en-US" sz="1100" dirty="0"/>
+          </a:p>
+        </p:txBody>
+      </p:sp>
+    </p:spTree>
+    <p:extLst>
+      <p:ext uri="{BB962C8B-B14F-4D97-AF65-F5344CB8AC3E}">
+        <p14:creationId xmlns:p14="http://schemas.microsoft.com/office/powerpoint/2010/main" val="759344303"/>
+      </p:ext>
+    </p:extLst>
+  </p:cSld>
+  <p:clrMapOvr>
+    <a:masterClrMapping/>
+  </p:clrMapOvr>
+</p:notes>
+</file>
+
+<file path=ppt/notesSlides/notesSlide7.xml><?xml version="1.0" encoding="utf-8"?>
+<p:notes xmlns:a="http://schemas.openxmlformats.org/drawingml/2006/main" xmlns:r="http://schemas.openxmlformats.org/officeDocument/2006/relationships" xmlns:p="http://schemas.openxmlformats.org/presentationml/2006/main">
+  <p:cSld>
+    <p:spTree>
+      <p:nvGrpSpPr>
+        <p:cNvPr id="1" name=""/>
+        <p:cNvGrpSpPr/>
+        <p:nvPr/>
+      </p:nvGrpSpPr>
+      <p:grpSpPr>
+        <a:xfrm>
+          <a:off x="0" y="0"/>
+          <a:ext cx="0" cy="0"/>
+          <a:chOff x="0" y="0"/>
+          <a:chExt cx="0" cy="0"/>
+        </a:xfrm>
+      </p:grpSpPr>
+      <p:sp>
+        <p:nvSpPr>
+          <p:cNvPr id="2" name="Slide Image Placeholder 1"/>
+          <p:cNvSpPr>
+            <a:spLocks noGrp="1" noRot="1" noChangeAspect="1"/>
+          </p:cNvSpPr>
+          <p:nvPr>
+            <p:ph type="sldImg"/>
+          </p:nvPr>
+        </p:nvSpPr>
+        <p:spPr>
+          <a:xfrm>
+            <a:off x="381000" y="685800"/>
+            <a:ext cx="6096000" cy="3429000"/>
+          </a:xfrm>
+        </p:spPr>
+      </p:sp>
+      <p:sp>
+        <p:nvSpPr>
+          <p:cNvPr id="3" name="Notes Placeholder 2"/>
+          <p:cNvSpPr>
+            <a:spLocks noGrp="1"/>
+          </p:cNvSpPr>
+          <p:nvPr>
+            <p:ph type="body" idx="1"/>
+          </p:nvPr>
+        </p:nvSpPr>
+        <p:spPr/>
+        <p:txBody>
+          <a:bodyPr/>
+          <a:lstStyle/>
+          <a:p>
+            <a:pPr marL="171450" indent="-171450" algn="just">
+              <a:buFont typeface="Arial" panose="020B0604020202020204" pitchFamily="34" charset="0"/>
+              <a:buChar char="•"/>
+            </a:pPr>
+            <a:r>
+              <a:rPr lang="en-US" sz="1100" dirty="0"/>
+              <a:t>If a square is detected, the program draws a bounding rectangle around it and annotates it with the color's name in real time. </a:t>
+            </a:r>
+          </a:p>
+          <a:p>
+            <a:pPr marL="171450" indent="-171450" algn="just">
+              <a:buFont typeface="Arial" panose="020B0604020202020204" pitchFamily="34" charset="0"/>
+              <a:buChar char="•"/>
+            </a:pPr>
+            <a:endParaRPr lang="en-US" sz="1100" dirty="0"/>
+          </a:p>
+          <a:p>
+            <a:pPr marL="171450" indent="-171450" algn="just">
+              <a:buFont typeface="Arial" panose="020B0604020202020204" pitchFamily="34" charset="0"/>
+              <a:buChar char="•"/>
+            </a:pPr>
+            <a:r>
+              <a:rPr lang="en-US" sz="1100" dirty="0"/>
+              <a:t>If </a:t>
+            </a:r>
+            <a:r>
+              <a:rPr lang="en-US" sz="1100" b="1" dirty="0"/>
+              <a:t>9 squares </a:t>
+            </a:r>
+            <a:r>
+              <a:rPr lang="en-US" sz="1100" dirty="0"/>
+              <a:t>are detected in a frame (Fig.3), they are sorted by their y-coordinates, grouped into sets of three (representing a row of the Rubik’s cube), and then sorted by their x-coordinates to </a:t>
+            </a:r>
+            <a:r>
+              <a:rPr lang="en-US" sz="1100" b="1" dirty="0"/>
+              <a:t>create a face</a:t>
+            </a:r>
+            <a:r>
+              <a:rPr lang="en-US" sz="1100" dirty="0"/>
+              <a:t>.</a:t>
+            </a:r>
+          </a:p>
+          <a:p>
+            <a:endParaRPr lang="pt-PT" dirty="0"/>
+          </a:p>
+        </p:txBody>
+      </p:sp>
+    </p:spTree>
+    <p:extLst>
+      <p:ext uri="{BB962C8B-B14F-4D97-AF65-F5344CB8AC3E}">
+        <p14:creationId xmlns:p14="http://schemas.microsoft.com/office/powerpoint/2010/main" val="242979964"/>
+      </p:ext>
+    </p:extLst>
+  </p:cSld>
+  <p:clrMapOvr>
+    <a:masterClrMapping/>
+  </p:clrMapOvr>
+</p:notes>
+</file>
+
+<file path=ppt/notesSlides/notesSlide8.xml><?xml version="1.0" encoding="utf-8"?>
 <p:notes xmlns:a="http://schemas.openxmlformats.org/drawingml/2006/main" xmlns:r="http://schemas.openxmlformats.org/officeDocument/2006/relationships" xmlns:p="http://schemas.openxmlformats.org/presentationml/2006/main">
   <p:cSld>
     <p:spTree>
@@ -8803,7 +9605,7 @@
         <p:spPr>
           <a:xfrm>
             <a:off x="975879" y="1348338"/>
-            <a:ext cx="7192241" cy="276999"/>
+            <a:ext cx="7192241" cy="461665"/>
           </a:xfrm>
           <a:prstGeom prst="rect">
             <a:avLst/>
@@ -8822,9 +9624,78 @@
             </a:pPr>
             <a:r>
               <a:rPr lang="en-US" sz="1200" dirty="0"/>
-              <a:t>A</a:t>
+              <a:t>White balancing is a process in image processing that aims to adjust colors in an image to ensure that white objects appear white, regardless of the lighting conditions.</a:t>
             </a:r>
-            <a:endParaRPr lang="en-US" sz="1100" dirty="0"/>
+          </a:p>
+        </p:txBody>
+      </p:sp>
+      <p:pic>
+        <p:nvPicPr>
+          <p:cNvPr id="5" name="Picture 4">
+            <a:extLst>
+              <a:ext uri="{FF2B5EF4-FFF2-40B4-BE49-F238E27FC236}">
+                <a16:creationId xmlns:a16="http://schemas.microsoft.com/office/drawing/2014/main" id="{1F557802-53CF-0E95-E1E6-0FE99A0CAFAC}"/>
+              </a:ext>
+            </a:extLst>
+          </p:cNvPr>
+          <p:cNvPicPr>
+            <a:picLocks noChangeAspect="1"/>
+          </p:cNvPicPr>
+          <p:nvPr/>
+        </p:nvPicPr>
+        <p:blipFill>
+          <a:blip r:embed="rId3"/>
+          <a:stretch>
+            <a:fillRect/>
+          </a:stretch>
+        </p:blipFill>
+        <p:spPr>
+          <a:xfrm>
+            <a:off x="2805287" y="1994245"/>
+            <a:ext cx="3533426" cy="2473398"/>
+          </a:xfrm>
+          <a:prstGeom prst="rect">
+            <a:avLst/>
+          </a:prstGeom>
+        </p:spPr>
+      </p:pic>
+      <p:sp>
+        <p:nvSpPr>
+          <p:cNvPr id="6" name="TextBox 5">
+            <a:extLst>
+              <a:ext uri="{FF2B5EF4-FFF2-40B4-BE49-F238E27FC236}">
+                <a16:creationId xmlns:a16="http://schemas.microsoft.com/office/drawing/2014/main" id="{8BABAEDE-CD60-9C76-8CCC-DD0F10DB67A7}"/>
+              </a:ext>
+            </a:extLst>
+          </p:cNvPr>
+          <p:cNvSpPr txBox="1"/>
+          <p:nvPr/>
+        </p:nvSpPr>
+        <p:spPr>
+          <a:xfrm>
+            <a:off x="3629884" y="4470132"/>
+            <a:ext cx="1884229" cy="230832"/>
+          </a:xfrm>
+          <a:prstGeom prst="rect">
+            <a:avLst/>
+          </a:prstGeom>
+          <a:noFill/>
+        </p:spPr>
+        <p:txBody>
+          <a:bodyPr wrap="square">
+            <a:spAutoFit/>
+          </a:bodyPr>
+          <a:lstStyle/>
+          <a:p>
+            <a:pPr algn="just"/>
+            <a:r>
+              <a:rPr lang="en-US" sz="900" b="1" dirty="0"/>
+              <a:t>Fig.1 – </a:t>
+            </a:r>
+            <a:r>
+              <a:rPr lang="en-US" sz="900" dirty="0"/>
+              <a:t>White Balancing function.</a:t>
+            </a:r>
           </a:p>
         </p:txBody>
       </p:sp>
@@ -8910,7 +9781,7 @@
         </p:nvCxnSpPr>
         <p:spPr>
           <a:xfrm>
-            <a:off x="8482664" y="1899418"/>
+            <a:off x="4816972" y="2857937"/>
             <a:ext cx="0" cy="344765"/>
           </a:xfrm>
           <a:prstGeom prst="straightConnector1">
@@ -8938,7 +9809,7 @@
         </p:nvCxnSpPr>
         <p:spPr>
           <a:xfrm>
-            <a:off x="5384101" y="1809754"/>
+            <a:off x="1718409" y="2768273"/>
             <a:ext cx="3098563" cy="0"/>
           </a:xfrm>
           <a:prstGeom prst="straightConnector1">
@@ -8966,7 +9837,7 @@
         </p:nvCxnSpPr>
         <p:spPr>
           <a:xfrm flipH="1" flipV="1">
-            <a:off x="7819163" y="1438427"/>
+            <a:off x="4153471" y="2396946"/>
             <a:ext cx="105" cy="165123"/>
           </a:xfrm>
           <a:prstGeom prst="straightConnector1">
@@ -8994,7 +9865,7 @@
         </p:nvCxnSpPr>
         <p:spPr>
           <a:xfrm flipH="1">
-            <a:off x="7146774" y="1951506"/>
+            <a:off x="3481082" y="2910025"/>
             <a:ext cx="105" cy="292677"/>
           </a:xfrm>
           <a:prstGeom prst="straightConnector1">
@@ -9022,7 +9893,7 @@
         </p:nvCxnSpPr>
         <p:spPr>
           <a:xfrm flipH="1" flipV="1">
-            <a:off x="6511156" y="1437243"/>
+            <a:off x="2845464" y="2395762"/>
             <a:ext cx="105" cy="165123"/>
           </a:xfrm>
           <a:prstGeom prst="straightConnector1">
@@ -9050,7 +9921,7 @@
         </p:nvCxnSpPr>
         <p:spPr>
           <a:xfrm flipH="1">
-            <a:off x="5846779" y="1947805"/>
+            <a:off x="2181087" y="2906324"/>
             <a:ext cx="105" cy="292677"/>
           </a:xfrm>
           <a:prstGeom prst="straightConnector1">
@@ -9078,7 +9949,7 @@
         </p:nvCxnSpPr>
         <p:spPr>
           <a:xfrm flipH="1" flipV="1">
-            <a:off x="5213916" y="1433639"/>
+            <a:off x="1548224" y="2392158"/>
             <a:ext cx="105" cy="165123"/>
           </a:xfrm>
           <a:prstGeom prst="straightConnector1">
@@ -9108,7 +9979,7 @@
         </p:nvSpPr>
         <p:spPr>
           <a:xfrm>
-            <a:off x="4388992" y="1138432"/>
+            <a:off x="723300" y="2096951"/>
             <a:ext cx="1449871" cy="342543"/>
           </a:xfrm>
           <a:prstGeom prst="rect">
@@ -9145,7 +10016,7 @@
         </p:nvSpPr>
         <p:spPr>
           <a:xfrm>
-            <a:off x="5908402" y="1134819"/>
+            <a:off x="2242710" y="2093338"/>
             <a:ext cx="1449765" cy="342543"/>
           </a:xfrm>
           <a:prstGeom prst="rect">
@@ -9182,7 +10053,7 @@
         </p:nvSpPr>
         <p:spPr>
           <a:xfrm>
-            <a:off x="5106541" y="2199287"/>
+            <a:off x="1440849" y="3157806"/>
             <a:ext cx="1463376" cy="342543"/>
           </a:xfrm>
           <a:prstGeom prst="rect">
@@ -9219,7 +10090,7 @@
         </p:nvSpPr>
         <p:spPr>
           <a:xfrm>
-            <a:off x="6416747" y="2203817"/>
+            <a:off x="2751055" y="3162336"/>
             <a:ext cx="1460054" cy="342543"/>
           </a:xfrm>
           <a:prstGeom prst="rect">
@@ -9256,7 +10127,7 @@
         </p:nvSpPr>
         <p:spPr>
           <a:xfrm>
-            <a:off x="7761187" y="2197200"/>
+            <a:off x="4095495" y="3155719"/>
             <a:ext cx="1339129" cy="344845"/>
           </a:xfrm>
           <a:prstGeom prst="rect">
@@ -9293,8 +10164,8 @@
         </p:nvSpPr>
         <p:spPr>
           <a:xfrm>
-            <a:off x="7080278" y="1148867"/>
-            <a:ext cx="1534593" cy="342543"/>
+            <a:off x="3414586" y="2107386"/>
+            <a:ext cx="1598044" cy="342543"/>
           </a:xfrm>
           <a:prstGeom prst="rect">
             <a:avLst/>
@@ -9313,7 +10184,7 @@
               <a:rPr lang="en-US" sz="800" b="1" dirty="0">
                 <a:latin typeface="+mj-lt"/>
               </a:rPr>
-              <a:t>(160-180, 100-255, 100-255)</a:t>
+              <a:t>(0/160-4/180, 100-255, 100-255)</a:t>
             </a:r>
           </a:p>
         </p:txBody>
@@ -9326,7 +10197,7 @@
         </p:nvSpPr>
         <p:spPr>
           <a:xfrm>
-            <a:off x="4983020" y="1600203"/>
+            <a:off x="1317328" y="2558722"/>
             <a:ext cx="451480" cy="444769"/>
           </a:xfrm>
           <a:prstGeom prst="rect">
@@ -9376,7 +10247,7 @@
         </p:nvSpPr>
         <p:spPr>
           <a:xfrm>
-            <a:off x="4969861" y="1725984"/>
+            <a:off x="1304169" y="2684503"/>
             <a:ext cx="477797" cy="173434"/>
           </a:xfrm>
           <a:prstGeom prst="rect">
@@ -9422,7 +10293,7 @@
         </p:nvSpPr>
         <p:spPr>
           <a:xfrm>
-            <a:off x="5621437" y="1614056"/>
+            <a:off x="1955745" y="2572575"/>
             <a:ext cx="451480" cy="444769"/>
           </a:xfrm>
           <a:prstGeom prst="rect">
@@ -9472,7 +10343,7 @@
         </p:nvSpPr>
         <p:spPr>
           <a:xfrm>
-            <a:off x="5615245" y="1706938"/>
+            <a:off x="1949553" y="2665457"/>
             <a:ext cx="477797" cy="247989"/>
           </a:xfrm>
           <a:prstGeom prst="rect">
@@ -9518,7 +10389,7 @@
         </p:nvSpPr>
         <p:spPr>
           <a:xfrm>
-            <a:off x="6278326" y="1600200"/>
+            <a:off x="2612634" y="2558719"/>
             <a:ext cx="451480" cy="444769"/>
           </a:xfrm>
           <a:prstGeom prst="rect">
@@ -9570,7 +10441,7 @@
         </p:nvSpPr>
         <p:spPr>
           <a:xfrm>
-            <a:off x="6272257" y="1699816"/>
+            <a:off x="2606565" y="2658335"/>
             <a:ext cx="477797" cy="247989"/>
           </a:xfrm>
           <a:prstGeom prst="rect">
@@ -9616,7 +10487,7 @@
         </p:nvSpPr>
         <p:spPr>
           <a:xfrm>
-            <a:off x="6921034" y="1600200"/>
+            <a:off x="3255342" y="2558719"/>
             <a:ext cx="451480" cy="444769"/>
           </a:xfrm>
           <a:prstGeom prst="rect">
@@ -9666,7 +10537,7 @@
         </p:nvSpPr>
         <p:spPr>
           <a:xfrm>
-            <a:off x="6874340" y="1691758"/>
+            <a:off x="3208648" y="2650277"/>
             <a:ext cx="552982" cy="247989"/>
           </a:xfrm>
           <a:prstGeom prst="rect">
@@ -9712,7 +10583,7 @@
         </p:nvSpPr>
         <p:spPr>
           <a:xfrm>
-            <a:off x="7584115" y="1600200"/>
+            <a:off x="3918423" y="2558719"/>
             <a:ext cx="451480" cy="444769"/>
           </a:xfrm>
           <a:prstGeom prst="rect">
@@ -9762,7 +10633,7 @@
         </p:nvSpPr>
         <p:spPr>
           <a:xfrm>
-            <a:off x="7584115" y="1691758"/>
+            <a:off x="3918423" y="2650277"/>
             <a:ext cx="477797" cy="247989"/>
           </a:xfrm>
           <a:prstGeom prst="rect">
@@ -9808,7 +10679,7 @@
         </p:nvSpPr>
         <p:spPr>
           <a:xfrm>
-            <a:off x="8226947" y="1608549"/>
+            <a:off x="4561255" y="2567068"/>
             <a:ext cx="451480" cy="444769"/>
           </a:xfrm>
           <a:prstGeom prst="rect">
@@ -9858,7 +10729,7 @@
         </p:nvSpPr>
         <p:spPr>
           <a:xfrm>
-            <a:off x="8212191" y="1698589"/>
+            <a:off x="4546499" y="2657108"/>
             <a:ext cx="506288" cy="247989"/>
           </a:xfrm>
           <a:prstGeom prst="rect">
@@ -9911,7 +10782,7 @@
         <p:spPr>
           <a:xfrm>
             <a:off x="745331" y="1495146"/>
-            <a:ext cx="3757113" cy="1938992"/>
+            <a:ext cx="3757113" cy="276999"/>
           </a:xfrm>
           <a:prstGeom prst="rect">
             <a:avLst/>
@@ -9930,68 +10801,7 @@
             </a:pPr>
             <a:r>
               <a:rPr lang="en-US" sz="1200" dirty="0"/>
-              <a:t>Each Rubik’s cube color has a </a:t>
-            </a:r>
-            <a:r>
-              <a:rPr lang="en-US" sz="1200" b="1" dirty="0"/>
-              <a:t>color range</a:t>
-            </a:r>
-            <a:r>
-              <a:rPr lang="en-US" sz="1200" dirty="0"/>
-              <a:t> in the </a:t>
-            </a:r>
-            <a:r>
-              <a:rPr lang="en-US" sz="1200" b="1" dirty="0"/>
               <a:t>HSV</a:t>
-            </a:r>
-            <a:r>
-              <a:rPr lang="en-US" sz="1200" dirty="0"/>
-              <a:t> format (Fig.1), which the program uses to isolate the regions in the frame that most likely contain Rubik's cube stickers of the desired color and produce a </a:t>
-            </a:r>
-            <a:r>
-              <a:rPr lang="en-US" sz="1200" b="1" dirty="0"/>
-              <a:t>mask</a:t>
-            </a:r>
-            <a:r>
-              <a:rPr lang="en-US" sz="1200" dirty="0"/>
-              <a:t> for each color.</a:t>
-            </a:r>
-          </a:p>
-          <a:p>
-            <a:endParaRPr lang="en-US" sz="1200" dirty="0"/>
-          </a:p>
-          <a:p>
-            <a:pPr marL="171450" indent="-171450">
-              <a:buFont typeface="Arial" panose="020B0604020202020204" pitchFamily="34" charset="0"/>
-              <a:buChar char="•"/>
-            </a:pPr>
-            <a:r>
-              <a:rPr lang="en-US" sz="1200" dirty="0"/>
-              <a:t>To improve the accuracy of color detection, additional image processing techniques were applied to the mask, such as </a:t>
-            </a:r>
-            <a:r>
-              <a:rPr lang="en-US" sz="1200" b="1" dirty="0"/>
-              <a:t>Gaussian blur</a:t>
-            </a:r>
-            <a:r>
-              <a:rPr lang="en-US" sz="1200" dirty="0"/>
-              <a:t>, </a:t>
-            </a:r>
-            <a:r>
-              <a:rPr lang="en-US" sz="1200" b="1" dirty="0"/>
-              <a:t>morphological operations</a:t>
-            </a:r>
-            <a:r>
-              <a:rPr lang="en-US" sz="1200" dirty="0"/>
-              <a:t>, and </a:t>
-            </a:r>
-            <a:r>
-              <a:rPr lang="en-US" sz="1200" b="1" dirty="0"/>
-              <a:t>edge detection</a:t>
-            </a:r>
-            <a:r>
-              <a:rPr lang="en-US" sz="1200" dirty="0"/>
-              <a:t>.</a:t>
             </a:r>
           </a:p>
         </p:txBody>
@@ -10010,8 +10820,8 @@
         </p:nvSpPr>
         <p:spPr>
           <a:xfrm>
-            <a:off x="4861931" y="2556975"/>
-            <a:ext cx="4024817" cy="369332"/>
+            <a:off x="723300" y="3515494"/>
+            <a:ext cx="4711323" cy="230832"/>
           </a:xfrm>
           <a:prstGeom prst="rect">
             <a:avLst/>
@@ -10027,7 +10837,7 @@
             <a:pPr algn="just"/>
             <a:r>
               <a:rPr lang="en-US" sz="900" b="1" dirty="0"/>
-              <a:t>Fig.1 - </a:t>
+              <a:t>Fig.2 - </a:t>
             </a:r>
             <a:r>
               <a:rPr lang="en-US" sz="900" dirty="0"/>
@@ -10038,10 +10848,10 @@
       </p:sp>
       <p:pic>
         <p:nvPicPr>
-          <p:cNvPr id="3" name="Picture 2">
+          <p:cNvPr id="5" name="Picture 4">
             <a:extLst>
               <a:ext uri="{FF2B5EF4-FFF2-40B4-BE49-F238E27FC236}">
-                <a16:creationId xmlns:a16="http://schemas.microsoft.com/office/drawing/2014/main" id="{738D78C7-5657-095E-5F9D-87F84EF6156C}"/>
+                <a16:creationId xmlns:a16="http://schemas.microsoft.com/office/drawing/2014/main" id="{9129DB5F-022E-ADC1-C0D2-639ABA42B247}"/>
               </a:ext>
             </a:extLst>
           </p:cNvPr>
@@ -10058,8 +10868,8 @@
         </p:blipFill>
         <p:spPr>
           <a:xfrm>
-            <a:off x="5915515" y="3011899"/>
-            <a:ext cx="2011037" cy="1607316"/>
+            <a:off x="5988849" y="1962843"/>
+            <a:ext cx="2307550" cy="1844303"/>
           </a:xfrm>
           <a:prstGeom prst="rect">
             <a:avLst/>
@@ -10068,10 +10878,10 @@
       </p:pic>
       <p:sp>
         <p:nvSpPr>
-          <p:cNvPr id="4" name="TextBox 3">
+          <p:cNvPr id="7" name="TextBox 6">
             <a:extLst>
               <a:ext uri="{FF2B5EF4-FFF2-40B4-BE49-F238E27FC236}">
-                <a16:creationId xmlns:a16="http://schemas.microsoft.com/office/drawing/2014/main" id="{12698810-26E5-E25D-2F99-E4AAFBAD5024}"/>
+                <a16:creationId xmlns:a16="http://schemas.microsoft.com/office/drawing/2014/main" id="{FD58A130-9740-0C73-9781-9C618F9EFFA4}"/>
               </a:ext>
             </a:extLst>
           </p:cNvPr>
@@ -10080,7 +10890,7 @@
         </p:nvSpPr>
         <p:spPr>
           <a:xfrm>
-            <a:off x="6327764" y="4698475"/>
+            <a:off x="6541493" y="3884826"/>
             <a:ext cx="1211235" cy="230832"/>
           </a:xfrm>
           <a:prstGeom prst="rect">
@@ -10097,51 +10907,11 @@
             <a:pPr algn="just"/>
             <a:r>
               <a:rPr lang="en-US" sz="900" b="1" dirty="0"/>
-              <a:t>Fig.2 – </a:t>
+              <a:t>Fig.3 – </a:t>
             </a:r>
             <a:r>
               <a:rPr lang="en-US" sz="900" dirty="0"/>
               <a:t>Blue mask.</a:t>
-            </a:r>
-          </a:p>
-        </p:txBody>
-      </p:sp>
-      <p:sp>
-        <p:nvSpPr>
-          <p:cNvPr id="6" name="TextBox 5">
-            <a:extLst>
-              <a:ext uri="{FF2B5EF4-FFF2-40B4-BE49-F238E27FC236}">
-                <a16:creationId xmlns:a16="http://schemas.microsoft.com/office/drawing/2014/main" id="{C5210BAB-3F2B-A794-F9E2-94F70B1EBC05}"/>
-              </a:ext>
-            </a:extLst>
-          </p:cNvPr>
-          <p:cNvSpPr txBox="1"/>
-          <p:nvPr/>
-        </p:nvSpPr>
-        <p:spPr>
-          <a:xfrm>
-            <a:off x="1057597" y="4235681"/>
-            <a:ext cx="3444847" cy="707886"/>
-          </a:xfrm>
-          <a:prstGeom prst="rect">
-            <a:avLst/>
-          </a:prstGeom>
-          <a:noFill/>
-        </p:spPr>
-        <p:txBody>
-          <a:bodyPr wrap="square">
-            <a:spAutoFit/>
-          </a:bodyPr>
-          <a:lstStyle/>
-          <a:p>
-            <a:pPr algn="just"/>
-            <a:r>
-              <a:rPr lang="en-US" sz="1000" b="1" dirty="0"/>
-              <a:t>Note: </a:t>
-            </a:r>
-            <a:r>
-              <a:rPr lang="en-US" sz="1000" dirty="0"/>
-              <a:t>In Fig.1, the ranges represent the acceptable color values for detecting each face in an environment controlled by us. The values may vary due to different lighting conditions. </a:t>
             </a:r>
           </a:p>
         </p:txBody>
@@ -10160,6 +10930,604 @@
 </file>
 
 <file path=ppt/slides/slide5.xml><?xml version="1.0" encoding="utf-8"?>
+<p:sld xmlns:a="http://schemas.openxmlformats.org/drawingml/2006/main" xmlns:r="http://schemas.openxmlformats.org/officeDocument/2006/relationships" xmlns:p="http://schemas.openxmlformats.org/presentationml/2006/main">
+  <p:cSld>
+    <p:spTree>
+      <p:nvGrpSpPr>
+        <p:cNvPr id="1" name="Shape 869"/>
+        <p:cNvGrpSpPr/>
+        <p:nvPr/>
+      </p:nvGrpSpPr>
+      <p:grpSpPr>
+        <a:xfrm>
+          <a:off x="0" y="0"/>
+          <a:ext cx="0" cy="0"/>
+          <a:chOff x="0" y="0"/>
+          <a:chExt cx="0" cy="0"/>
+        </a:xfrm>
+      </p:grpSpPr>
+      <p:sp>
+        <p:nvSpPr>
+          <p:cNvPr id="870" name="Google Shape;870;p48"/>
+          <p:cNvSpPr txBox="1">
+            <a:spLocks noGrp="1"/>
+          </p:cNvSpPr>
+          <p:nvPr>
+            <p:ph type="title"/>
+          </p:nvPr>
+        </p:nvSpPr>
+        <p:spPr>
+          <a:xfrm>
+            <a:off x="723300" y="445025"/>
+            <a:ext cx="7697400" cy="572700"/>
+          </a:xfrm>
+          <a:prstGeom prst="rect">
+            <a:avLst/>
+          </a:prstGeom>
+        </p:spPr>
+        <p:txBody>
+          <a:bodyPr spcFirstLastPara="1" wrap="square" lIns="91425" tIns="91425" rIns="91425" bIns="91425" anchor="t" anchorCtr="0">
+            <a:noAutofit/>
+          </a:bodyPr>
+          <a:lstStyle/>
+          <a:p>
+            <a:pPr marL="0" lvl="0" indent="0" algn="ctr" rtl="0">
+              <a:spcBef>
+                <a:spcPts val="0"/>
+              </a:spcBef>
+              <a:spcAft>
+                <a:spcPts val="0"/>
+              </a:spcAft>
+              <a:buNone/>
+            </a:pPr>
+            <a:r>
+              <a:rPr lang="en" dirty="0"/>
+              <a:t>Color Detection</a:t>
+            </a:r>
+            <a:endParaRPr dirty="0"/>
+          </a:p>
+        </p:txBody>
+      </p:sp>
+      <p:sp>
+        <p:nvSpPr>
+          <p:cNvPr id="10" name="TextBox 9">
+            <a:extLst>
+              <a:ext uri="{FF2B5EF4-FFF2-40B4-BE49-F238E27FC236}">
+                <a16:creationId xmlns:a16="http://schemas.microsoft.com/office/drawing/2014/main" id="{2FAEC24D-0995-0399-CA46-2AF34C2AE8C1}"/>
+              </a:ext>
+            </a:extLst>
+          </p:cNvPr>
+          <p:cNvSpPr txBox="1"/>
+          <p:nvPr/>
+        </p:nvSpPr>
+        <p:spPr>
+          <a:xfrm>
+            <a:off x="745331" y="1495146"/>
+            <a:ext cx="3757113" cy="276999"/>
+          </a:xfrm>
+          <a:prstGeom prst="rect">
+            <a:avLst/>
+          </a:prstGeom>
+          <a:noFill/>
+        </p:spPr>
+        <p:txBody>
+          <a:bodyPr wrap="square" rtlCol="0">
+            <a:spAutoFit/>
+          </a:bodyPr>
+          <a:lstStyle/>
+          <a:p>
+            <a:pPr marL="171450" indent="-171450">
+              <a:buFont typeface="Arial" panose="020B0604020202020204" pitchFamily="34" charset="0"/>
+              <a:buChar char="•"/>
+            </a:pPr>
+            <a:r>
+              <a:rPr lang="en-US" sz="1200" dirty="0"/>
+              <a:t>L*a*b*</a:t>
+            </a:r>
+          </a:p>
+        </p:txBody>
+      </p:sp>
+      <p:sp>
+        <p:nvSpPr>
+          <p:cNvPr id="2" name="TextBox 1">
+            <a:extLst>
+              <a:ext uri="{FF2B5EF4-FFF2-40B4-BE49-F238E27FC236}">
+                <a16:creationId xmlns:a16="http://schemas.microsoft.com/office/drawing/2014/main" id="{E1E19163-9651-435A-617F-4B3F4BEC887A}"/>
+              </a:ext>
+            </a:extLst>
+          </p:cNvPr>
+          <p:cNvSpPr txBox="1"/>
+          <p:nvPr/>
+        </p:nvSpPr>
+        <p:spPr>
+          <a:xfrm>
+            <a:off x="3891057" y="4130857"/>
+            <a:ext cx="1529853" cy="230832"/>
+          </a:xfrm>
+          <a:prstGeom prst="rect">
+            <a:avLst/>
+          </a:prstGeom>
+          <a:noFill/>
+        </p:spPr>
+        <p:txBody>
+          <a:bodyPr wrap="square">
+            <a:spAutoFit/>
+          </a:bodyPr>
+          <a:lstStyle/>
+          <a:p>
+            <a:pPr algn="just"/>
+            <a:r>
+              <a:rPr lang="en-US" sz="900" b="1" dirty="0"/>
+              <a:t>Fig.4 – </a:t>
+            </a:r>
+            <a:r>
+              <a:rPr lang="en-US" sz="900" dirty="0"/>
+              <a:t>Colors calibration</a:t>
+            </a:r>
+          </a:p>
+        </p:txBody>
+      </p:sp>
+      <p:pic>
+        <p:nvPicPr>
+          <p:cNvPr id="4" name="Picture 3">
+            <a:extLst>
+              <a:ext uri="{FF2B5EF4-FFF2-40B4-BE49-F238E27FC236}">
+                <a16:creationId xmlns:a16="http://schemas.microsoft.com/office/drawing/2014/main" id="{D25F9963-BFFC-8790-F095-9664293F1E26}"/>
+              </a:ext>
+            </a:extLst>
+          </p:cNvPr>
+          <p:cNvPicPr>
+            <a:picLocks noChangeAspect="1"/>
+          </p:cNvPicPr>
+          <p:nvPr/>
+        </p:nvPicPr>
+        <p:blipFill>
+          <a:blip r:embed="rId3"/>
+          <a:stretch>
+            <a:fillRect/>
+          </a:stretch>
+        </p:blipFill>
+        <p:spPr>
+          <a:xfrm>
+            <a:off x="3172899" y="1893443"/>
+            <a:ext cx="2798201" cy="2231532"/>
+          </a:xfrm>
+          <a:prstGeom prst="rect">
+            <a:avLst/>
+          </a:prstGeom>
+        </p:spPr>
+      </p:pic>
+    </p:spTree>
+    <p:extLst>
+      <p:ext uri="{BB962C8B-B14F-4D97-AF65-F5344CB8AC3E}">
+        <p14:creationId xmlns:p14="http://schemas.microsoft.com/office/powerpoint/2010/main" val="1211020142"/>
+      </p:ext>
+    </p:extLst>
+  </p:cSld>
+  <p:clrMapOvr>
+    <a:masterClrMapping/>
+  </p:clrMapOvr>
+</p:sld>
+</file>
+
+<file path=ppt/slides/slide6.xml><?xml version="1.0" encoding="utf-8"?>
+<p:sld xmlns:a="http://schemas.openxmlformats.org/drawingml/2006/main" xmlns:r="http://schemas.openxmlformats.org/officeDocument/2006/relationships" xmlns:p="http://schemas.openxmlformats.org/presentationml/2006/main">
+  <p:cSld>
+    <p:spTree>
+      <p:nvGrpSpPr>
+        <p:cNvPr id="1" name="Shape 869"/>
+        <p:cNvGrpSpPr/>
+        <p:nvPr/>
+      </p:nvGrpSpPr>
+      <p:grpSpPr>
+        <a:xfrm>
+          <a:off x="0" y="0"/>
+          <a:ext cx="0" cy="0"/>
+          <a:chOff x="0" y="0"/>
+          <a:chExt cx="0" cy="0"/>
+        </a:xfrm>
+      </p:grpSpPr>
+      <p:sp>
+        <p:nvSpPr>
+          <p:cNvPr id="870" name="Google Shape;870;p48"/>
+          <p:cNvSpPr txBox="1">
+            <a:spLocks noGrp="1"/>
+          </p:cNvSpPr>
+          <p:nvPr>
+            <p:ph type="title"/>
+          </p:nvPr>
+        </p:nvSpPr>
+        <p:spPr>
+          <a:xfrm>
+            <a:off x="723300" y="445025"/>
+            <a:ext cx="7697400" cy="572700"/>
+          </a:xfrm>
+          <a:prstGeom prst="rect">
+            <a:avLst/>
+          </a:prstGeom>
+        </p:spPr>
+        <p:txBody>
+          <a:bodyPr spcFirstLastPara="1" wrap="square" lIns="91425" tIns="91425" rIns="91425" bIns="91425" anchor="t" anchorCtr="0">
+            <a:noAutofit/>
+          </a:bodyPr>
+          <a:lstStyle/>
+          <a:p>
+            <a:pPr marL="0" lvl="0" indent="0" algn="ctr" rtl="0">
+              <a:spcBef>
+                <a:spcPts val="0"/>
+              </a:spcBef>
+              <a:spcAft>
+                <a:spcPts val="0"/>
+              </a:spcAft>
+              <a:buNone/>
+            </a:pPr>
+            <a:r>
+              <a:rPr lang="en" dirty="0"/>
+              <a:t>Processing Techniques</a:t>
+            </a:r>
+            <a:endParaRPr dirty="0"/>
+          </a:p>
+        </p:txBody>
+      </p:sp>
+      <p:sp>
+        <p:nvSpPr>
+          <p:cNvPr id="8" name="TextBox 7">
+            <a:extLst>
+              <a:ext uri="{FF2B5EF4-FFF2-40B4-BE49-F238E27FC236}">
+                <a16:creationId xmlns:a16="http://schemas.microsoft.com/office/drawing/2014/main" id="{BCEF8B1E-2800-E5D5-3869-1B7A0EC9121C}"/>
+              </a:ext>
+            </a:extLst>
+          </p:cNvPr>
+          <p:cNvSpPr txBox="1"/>
+          <p:nvPr/>
+        </p:nvSpPr>
+        <p:spPr>
+          <a:xfrm>
+            <a:off x="1690942" y="2805836"/>
+            <a:ext cx="1346627" cy="230832"/>
+          </a:xfrm>
+          <a:prstGeom prst="rect">
+            <a:avLst/>
+          </a:prstGeom>
+          <a:noFill/>
+        </p:spPr>
+        <p:txBody>
+          <a:bodyPr wrap="square">
+            <a:spAutoFit/>
+          </a:bodyPr>
+          <a:lstStyle/>
+          <a:p>
+            <a:pPr algn="just"/>
+            <a:r>
+              <a:rPr lang="en-US" sz="900" b="1" dirty="0"/>
+              <a:t>Fig.5 – </a:t>
+            </a:r>
+            <a:r>
+              <a:rPr lang="en-US" sz="900" dirty="0"/>
+              <a:t>Original frame</a:t>
+            </a:r>
+          </a:p>
+        </p:txBody>
+      </p:sp>
+      <p:sp>
+        <p:nvSpPr>
+          <p:cNvPr id="9" name="TextBox 8">
+            <a:extLst>
+              <a:ext uri="{FF2B5EF4-FFF2-40B4-BE49-F238E27FC236}">
+                <a16:creationId xmlns:a16="http://schemas.microsoft.com/office/drawing/2014/main" id="{A5B89405-E76C-C73B-7E98-9F054A489C2C}"/>
+              </a:ext>
+            </a:extLst>
+          </p:cNvPr>
+          <p:cNvSpPr txBox="1"/>
+          <p:nvPr/>
+        </p:nvSpPr>
+        <p:spPr>
+          <a:xfrm>
+            <a:off x="6224819" y="2787857"/>
+            <a:ext cx="1416886" cy="230832"/>
+          </a:xfrm>
+          <a:prstGeom prst="rect">
+            <a:avLst/>
+          </a:prstGeom>
+          <a:noFill/>
+        </p:spPr>
+        <p:txBody>
+          <a:bodyPr wrap="square">
+            <a:spAutoFit/>
+          </a:bodyPr>
+          <a:lstStyle/>
+          <a:p>
+            <a:pPr algn="just"/>
+            <a:r>
+              <a:rPr lang="en-US" sz="900" b="1" dirty="0"/>
+              <a:t>Fig.7 – </a:t>
+            </a:r>
+            <a:r>
+              <a:rPr lang="en-US" sz="900" dirty="0"/>
+              <a:t>Gaussian Blur</a:t>
+            </a:r>
+          </a:p>
+        </p:txBody>
+      </p:sp>
+      <p:sp>
+        <p:nvSpPr>
+          <p:cNvPr id="11" name="TextBox 10">
+            <a:extLst>
+              <a:ext uri="{FF2B5EF4-FFF2-40B4-BE49-F238E27FC236}">
+                <a16:creationId xmlns:a16="http://schemas.microsoft.com/office/drawing/2014/main" id="{54C3DE23-A859-D0C4-9AEB-798875CEA580}"/>
+              </a:ext>
+            </a:extLst>
+          </p:cNvPr>
+          <p:cNvSpPr txBox="1"/>
+          <p:nvPr/>
+        </p:nvSpPr>
+        <p:spPr>
+          <a:xfrm>
+            <a:off x="5087589" y="4785346"/>
+            <a:ext cx="1793975" cy="230832"/>
+          </a:xfrm>
+          <a:prstGeom prst="rect">
+            <a:avLst/>
+          </a:prstGeom>
+          <a:noFill/>
+        </p:spPr>
+        <p:txBody>
+          <a:bodyPr wrap="square">
+            <a:spAutoFit/>
+          </a:bodyPr>
+          <a:lstStyle/>
+          <a:p>
+            <a:pPr algn="just"/>
+            <a:r>
+              <a:rPr lang="en-US" sz="900" b="1" dirty="0"/>
+              <a:t>Fig.9 – </a:t>
+            </a:r>
+            <a:r>
+              <a:rPr lang="en-US" sz="900" dirty="0"/>
+              <a:t>Canny Edge Detection</a:t>
+            </a:r>
+          </a:p>
+        </p:txBody>
+      </p:sp>
+      <p:pic>
+        <p:nvPicPr>
+          <p:cNvPr id="12" name="Picture 11">
+            <a:extLst>
+              <a:ext uri="{FF2B5EF4-FFF2-40B4-BE49-F238E27FC236}">
+                <a16:creationId xmlns:a16="http://schemas.microsoft.com/office/drawing/2014/main" id="{C015374E-E15B-7C3F-0416-D932B1FEA578}"/>
+              </a:ext>
+            </a:extLst>
+          </p:cNvPr>
+          <p:cNvPicPr>
+            <a:picLocks noChangeAspect="1"/>
+          </p:cNvPicPr>
+          <p:nvPr/>
+        </p:nvPicPr>
+        <p:blipFill rotWithShape="1">
+          <a:blip r:embed="rId3"/>
+          <a:srcRect l="34141" t="53945" r="32708" b="1174"/>
+          <a:stretch/>
+        </p:blipFill>
+        <p:spPr>
+          <a:xfrm>
+            <a:off x="4775378" y="3087240"/>
+            <a:ext cx="2352630" cy="1708384"/>
+          </a:xfrm>
+          <a:prstGeom prst="rect">
+            <a:avLst/>
+          </a:prstGeom>
+        </p:spPr>
+      </p:pic>
+      <p:pic>
+        <p:nvPicPr>
+          <p:cNvPr id="13" name="Picture 12">
+            <a:extLst>
+              <a:ext uri="{FF2B5EF4-FFF2-40B4-BE49-F238E27FC236}">
+                <a16:creationId xmlns:a16="http://schemas.microsoft.com/office/drawing/2014/main" id="{53C18B6A-BCAB-18C0-6B73-D48C79BEF441}"/>
+              </a:ext>
+            </a:extLst>
+          </p:cNvPr>
+          <p:cNvPicPr>
+            <a:picLocks noChangeAspect="1"/>
+          </p:cNvPicPr>
+          <p:nvPr/>
+        </p:nvPicPr>
+        <p:blipFill rotWithShape="1">
+          <a:blip r:embed="rId3"/>
+          <a:srcRect l="3048" t="2338" r="66951" b="50336"/>
+          <a:stretch/>
+        </p:blipFill>
+        <p:spPr>
+          <a:xfrm>
+            <a:off x="1365606" y="1122163"/>
+            <a:ext cx="1997301" cy="1690033"/>
+          </a:xfrm>
+          <a:prstGeom prst="rect">
+            <a:avLst/>
+          </a:prstGeom>
+        </p:spPr>
+      </p:pic>
+      <p:pic>
+        <p:nvPicPr>
+          <p:cNvPr id="14" name="Picture 13">
+            <a:extLst>
+              <a:ext uri="{FF2B5EF4-FFF2-40B4-BE49-F238E27FC236}">
+                <a16:creationId xmlns:a16="http://schemas.microsoft.com/office/drawing/2014/main" id="{52A51599-921D-13EE-C031-A65FBBC5F705}"/>
+              </a:ext>
+            </a:extLst>
+          </p:cNvPr>
+          <p:cNvPicPr>
+            <a:picLocks noChangeAspect="1"/>
+          </p:cNvPicPr>
+          <p:nvPr/>
+        </p:nvPicPr>
+        <p:blipFill rotWithShape="1">
+          <a:blip r:embed="rId3"/>
+          <a:srcRect l="33461" t="2907" r="32818" b="49765"/>
+          <a:stretch/>
+        </p:blipFill>
+        <p:spPr>
+          <a:xfrm>
+            <a:off x="3486614" y="1122163"/>
+            <a:ext cx="2243406" cy="1688812"/>
+          </a:xfrm>
+          <a:prstGeom prst="rect">
+            <a:avLst/>
+          </a:prstGeom>
+        </p:spPr>
+      </p:pic>
+      <p:pic>
+        <p:nvPicPr>
+          <p:cNvPr id="15" name="Picture 14">
+            <a:extLst>
+              <a:ext uri="{FF2B5EF4-FFF2-40B4-BE49-F238E27FC236}">
+                <a16:creationId xmlns:a16="http://schemas.microsoft.com/office/drawing/2014/main" id="{2551CD56-D4F2-7107-D7F8-F7EFEFCB156F}"/>
+              </a:ext>
+            </a:extLst>
+          </p:cNvPr>
+          <p:cNvPicPr>
+            <a:picLocks noChangeAspect="1"/>
+          </p:cNvPicPr>
+          <p:nvPr/>
+        </p:nvPicPr>
+        <p:blipFill rotWithShape="1">
+          <a:blip r:embed="rId3"/>
+          <a:srcRect l="67492" t="3791" b="50055"/>
+          <a:stretch/>
+        </p:blipFill>
+        <p:spPr>
+          <a:xfrm>
+            <a:off x="5811559" y="1102591"/>
+            <a:ext cx="2243406" cy="1708384"/>
+          </a:xfrm>
+          <a:prstGeom prst="rect">
+            <a:avLst/>
+          </a:prstGeom>
+        </p:spPr>
+      </p:pic>
+      <p:pic>
+        <p:nvPicPr>
+          <p:cNvPr id="16" name="Picture 15">
+            <a:extLst>
+              <a:ext uri="{FF2B5EF4-FFF2-40B4-BE49-F238E27FC236}">
+                <a16:creationId xmlns:a16="http://schemas.microsoft.com/office/drawing/2014/main" id="{AD2025E6-87D4-6FEB-D265-AF910E3C9A69}"/>
+              </a:ext>
+            </a:extLst>
+          </p:cNvPr>
+          <p:cNvPicPr>
+            <a:picLocks noChangeAspect="1"/>
+          </p:cNvPicPr>
+          <p:nvPr/>
+        </p:nvPicPr>
+        <p:blipFill rotWithShape="1">
+          <a:blip r:embed="rId3"/>
+          <a:srcRect t="53202" r="66849" b="1917"/>
+          <a:stretch/>
+        </p:blipFill>
+        <p:spPr>
+          <a:xfrm>
+            <a:off x="1971625" y="3105591"/>
+            <a:ext cx="2327359" cy="1690033"/>
+          </a:xfrm>
+          <a:prstGeom prst="rect">
+            <a:avLst/>
+          </a:prstGeom>
+        </p:spPr>
+      </p:pic>
+      <p:sp>
+        <p:nvSpPr>
+          <p:cNvPr id="17" name="TextBox 16">
+            <a:extLst>
+              <a:ext uri="{FF2B5EF4-FFF2-40B4-BE49-F238E27FC236}">
+                <a16:creationId xmlns:a16="http://schemas.microsoft.com/office/drawing/2014/main" id="{B75F1D31-C776-6FF1-F277-A216FDE67632}"/>
+              </a:ext>
+            </a:extLst>
+          </p:cNvPr>
+          <p:cNvSpPr txBox="1"/>
+          <p:nvPr/>
+        </p:nvSpPr>
+        <p:spPr>
+          <a:xfrm>
+            <a:off x="4176162" y="2805836"/>
+            <a:ext cx="874935" cy="230832"/>
+          </a:xfrm>
+          <a:prstGeom prst="rect">
+            <a:avLst/>
+          </a:prstGeom>
+          <a:noFill/>
+        </p:spPr>
+        <p:txBody>
+          <a:bodyPr wrap="square">
+            <a:spAutoFit/>
+          </a:bodyPr>
+          <a:lstStyle/>
+          <a:p>
+            <a:pPr algn="just"/>
+            <a:r>
+              <a:rPr lang="en-US" sz="900" b="1" dirty="0"/>
+              <a:t>Fig.6 – </a:t>
+            </a:r>
+            <a:r>
+              <a:rPr lang="en-US" sz="900" dirty="0"/>
+              <a:t>Mask</a:t>
+            </a:r>
+          </a:p>
+        </p:txBody>
+      </p:sp>
+      <p:sp>
+        <p:nvSpPr>
+          <p:cNvPr id="18" name="TextBox 17">
+            <a:extLst>
+              <a:ext uri="{FF2B5EF4-FFF2-40B4-BE49-F238E27FC236}">
+                <a16:creationId xmlns:a16="http://schemas.microsoft.com/office/drawing/2014/main" id="{A283FB5F-D80F-B789-7C79-B34CA007B5D0}"/>
+              </a:ext>
+            </a:extLst>
+          </p:cNvPr>
+          <p:cNvSpPr txBox="1"/>
+          <p:nvPr/>
+        </p:nvSpPr>
+        <p:spPr>
+          <a:xfrm>
+            <a:off x="2247688" y="4785346"/>
+            <a:ext cx="1912070" cy="230832"/>
+          </a:xfrm>
+          <a:prstGeom prst="rect">
+            <a:avLst/>
+          </a:prstGeom>
+          <a:noFill/>
+        </p:spPr>
+        <p:txBody>
+          <a:bodyPr wrap="square">
+            <a:spAutoFit/>
+          </a:bodyPr>
+          <a:lstStyle/>
+          <a:p>
+            <a:pPr algn="just"/>
+            <a:r>
+              <a:rPr lang="en-US" sz="900" b="1" dirty="0"/>
+              <a:t>Fig.8 – </a:t>
+            </a:r>
+            <a:r>
+              <a:rPr lang="en-US" sz="900" dirty="0"/>
+              <a:t>Morphological Operations</a:t>
+            </a:r>
+          </a:p>
+        </p:txBody>
+      </p:sp>
+    </p:spTree>
+    <p:extLst>
+      <p:ext uri="{BB962C8B-B14F-4D97-AF65-F5344CB8AC3E}">
+        <p14:creationId xmlns:p14="http://schemas.microsoft.com/office/powerpoint/2010/main" val="2095518807"/>
+      </p:ext>
+    </p:extLst>
+  </p:cSld>
+  <p:clrMapOvr>
+    <a:masterClrMapping/>
+  </p:clrMapOvr>
+</p:sld>
+</file>
+
+<file path=ppt/slides/slide7.xml><?xml version="1.0" encoding="utf-8"?>
 <p:sld xmlns:a="http://schemas.openxmlformats.org/drawingml/2006/main" xmlns:r="http://schemas.openxmlformats.org/officeDocument/2006/relationships" xmlns:p="http://schemas.openxmlformats.org/presentationml/2006/main">
   <p:cSld>
     <p:spTree>
@@ -10228,7 +11596,7 @@
         <p:spPr>
           <a:xfrm>
             <a:off x="723300" y="1416753"/>
-            <a:ext cx="5365773" cy="2339102"/>
+            <a:ext cx="5365773" cy="1046440"/>
           </a:xfrm>
           <a:prstGeom prst="rect">
             <a:avLst/>
@@ -10331,53 +11699,6 @@
               <a:t> are considered.</a:t>
             </a:r>
           </a:p>
-          <a:p>
-            <a:pPr marL="188550" algn="just"/>
-            <a:endParaRPr lang="en-US" sz="1200" dirty="0"/>
-          </a:p>
-          <a:p>
-            <a:pPr marL="171450" indent="-171450" algn="just">
-              <a:buFont typeface="Arial" panose="020B0604020202020204" pitchFamily="34" charset="0"/>
-              <a:buChar char="•"/>
-            </a:pPr>
-            <a:r>
-              <a:rPr lang="en-US" sz="1200" dirty="0"/>
-              <a:t>If a square is detected, the program draws a bounding rectangle around it and annotates it with the color's name in real time. </a:t>
-            </a:r>
-          </a:p>
-          <a:p>
-            <a:pPr marL="171450" indent="-171450" algn="just">
-              <a:buFont typeface="Arial" panose="020B0604020202020204" pitchFamily="34" charset="0"/>
-              <a:buChar char="•"/>
-            </a:pPr>
-            <a:endParaRPr lang="en-US" sz="1200" dirty="0"/>
-          </a:p>
-          <a:p>
-            <a:pPr marL="171450" indent="-171450" algn="just">
-              <a:buFont typeface="Arial" panose="020B0604020202020204" pitchFamily="34" charset="0"/>
-              <a:buChar char="•"/>
-            </a:pPr>
-            <a:r>
-              <a:rPr lang="en-US" sz="1200" dirty="0"/>
-              <a:t>If </a:t>
-            </a:r>
-            <a:r>
-              <a:rPr lang="en-US" sz="1200" b="1" dirty="0"/>
-              <a:t>9 squares </a:t>
-            </a:r>
-            <a:r>
-              <a:rPr lang="en-US" sz="1200" dirty="0"/>
-              <a:t>are detected in a frame (Fig.3), they are sorted by their y-coordinates, grouped into sets of three (representing a row of the Rubik’s cube), and then sorted by their x-coordinates to </a:t>
-            </a:r>
-            <a:r>
-              <a:rPr lang="en-US" sz="1200" b="1" dirty="0"/>
-              <a:t>create a face</a:t>
-            </a:r>
-            <a:r>
-              <a:rPr lang="en-US" sz="1200" dirty="0"/>
-              <a:t>.</a:t>
-            </a:r>
-          </a:p>
         </p:txBody>
       </p:sp>
       <p:pic>
@@ -10395,13 +11716,13 @@
           <p:nvPr/>
         </p:nvPicPr>
         <p:blipFill rotWithShape="1">
-          <a:blip r:embed="rId2"/>
+          <a:blip r:embed="rId3"/>
           <a:srcRect l="38750" t="13750" r="22044" b="42008"/>
           <a:stretch/>
         </p:blipFill>
         <p:spPr>
           <a:xfrm>
-            <a:off x="6586467" y="1715016"/>
+            <a:off x="6214760" y="2015975"/>
             <a:ext cx="2024560" cy="1713468"/>
           </a:xfrm>
           <a:prstGeom prst="rect">
@@ -10423,7 +11744,7 @@
         </p:nvSpPr>
         <p:spPr>
           <a:xfrm>
-            <a:off x="6768160" y="1104941"/>
+            <a:off x="6396453" y="1405900"/>
             <a:ext cx="676939" cy="215444"/>
           </a:xfrm>
           <a:prstGeom prst="rect">
@@ -10458,7 +11779,7 @@
         </p:nvSpPr>
         <p:spPr>
           <a:xfrm>
-            <a:off x="7235469" y="1257910"/>
+            <a:off x="6863762" y="1558869"/>
             <a:ext cx="669851" cy="215444"/>
           </a:xfrm>
           <a:prstGeom prst="rect">
@@ -10496,7 +11817,7 @@
         </p:nvCxnSpPr>
         <p:spPr>
           <a:xfrm flipV="1">
-            <a:off x="6913844" y="1320385"/>
+            <a:off x="6542137" y="1621344"/>
             <a:ext cx="192786" cy="710142"/>
           </a:xfrm>
           <a:prstGeom prst="straightConnector1">
@@ -10533,7 +11854,7 @@
         </p:nvCxnSpPr>
         <p:spPr>
           <a:xfrm flipV="1">
-            <a:off x="7359429" y="1473354"/>
+            <a:off x="6987722" y="1774313"/>
             <a:ext cx="210966" cy="557173"/>
           </a:xfrm>
           <a:prstGeom prst="straightConnector1">
@@ -10570,7 +11891,7 @@
         </p:nvCxnSpPr>
         <p:spPr>
           <a:xfrm flipV="1">
-            <a:off x="7817700" y="1623421"/>
+            <a:off x="7445993" y="1924380"/>
             <a:ext cx="225756" cy="407106"/>
           </a:xfrm>
           <a:prstGeom prst="straightConnector1">
@@ -10604,7 +11925,7 @@
         </p:nvSpPr>
         <p:spPr>
           <a:xfrm>
-            <a:off x="7701442" y="1407977"/>
+            <a:off x="7329735" y="1708936"/>
             <a:ext cx="684027" cy="215444"/>
           </a:xfrm>
           <a:prstGeom prst="rect">
@@ -10639,7 +11960,7 @@
         </p:nvSpPr>
         <p:spPr>
           <a:xfrm>
-            <a:off x="6089073" y="2571750"/>
+            <a:off x="5717366" y="2872709"/>
             <a:ext cx="676939" cy="215444"/>
           </a:xfrm>
           <a:prstGeom prst="rect">
@@ -10674,7 +11995,7 @@
         </p:nvSpPr>
         <p:spPr>
           <a:xfrm>
-            <a:off x="8510233" y="2982024"/>
+            <a:off x="8138526" y="3282983"/>
             <a:ext cx="669851" cy="215444"/>
           </a:xfrm>
           <a:prstGeom prst="rect">
@@ -10709,7 +12030,7 @@
         </p:nvSpPr>
         <p:spPr>
           <a:xfrm>
-            <a:off x="8510233" y="2725616"/>
+            <a:off x="8138526" y="3026575"/>
             <a:ext cx="684027" cy="215444"/>
           </a:xfrm>
           <a:prstGeom prst="rect">
@@ -10747,7 +12068,7 @@
         </p:nvCxnSpPr>
         <p:spPr>
           <a:xfrm flipH="1">
-            <a:off x="6766012" y="2486534"/>
+            <a:off x="6394305" y="2787493"/>
             <a:ext cx="147832" cy="192938"/>
           </a:xfrm>
           <a:prstGeom prst="straightConnector1">
@@ -10784,7 +12105,7 @@
         </p:nvCxnSpPr>
         <p:spPr>
           <a:xfrm>
-            <a:off x="7393662" y="2486534"/>
+            <a:off x="7021955" y="2787493"/>
             <a:ext cx="1116571" cy="603212"/>
           </a:xfrm>
           <a:prstGeom prst="straightConnector1">
@@ -10821,7 +12142,7 @@
         </p:nvCxnSpPr>
         <p:spPr>
           <a:xfrm>
-            <a:off x="7817700" y="2492105"/>
+            <a:off x="7445993" y="2793064"/>
             <a:ext cx="692533" cy="341233"/>
           </a:xfrm>
           <a:prstGeom prst="straightConnector1">
@@ -10855,7 +12176,7 @@
         </p:nvSpPr>
         <p:spPr>
           <a:xfrm>
-            <a:off x="6739961" y="3549523"/>
+            <a:off x="6368254" y="3850482"/>
             <a:ext cx="676939" cy="215444"/>
           </a:xfrm>
           <a:prstGeom prst="rect">
@@ -10890,7 +12211,7 @@
         </p:nvSpPr>
         <p:spPr>
           <a:xfrm>
-            <a:off x="7249097" y="3700820"/>
+            <a:off x="6877390" y="4001779"/>
             <a:ext cx="669851" cy="215444"/>
           </a:xfrm>
           <a:prstGeom prst="rect">
@@ -10928,7 +12249,7 @@
         </p:nvCxnSpPr>
         <p:spPr>
           <a:xfrm>
-            <a:off x="6913844" y="2937164"/>
+            <a:off x="6542137" y="3238123"/>
             <a:ext cx="164587" cy="612359"/>
           </a:xfrm>
           <a:prstGeom prst="straightConnector1">
@@ -10965,7 +12286,7 @@
         </p:nvCxnSpPr>
         <p:spPr>
           <a:xfrm>
-            <a:off x="7393662" y="2937164"/>
+            <a:off x="7021955" y="3238123"/>
             <a:ext cx="190361" cy="763656"/>
           </a:xfrm>
           <a:prstGeom prst="straightConnector1">
@@ -11002,7 +12323,7 @@
         </p:nvCxnSpPr>
         <p:spPr>
           <a:xfrm>
-            <a:off x="7817700" y="2937164"/>
+            <a:off x="7445993" y="3238123"/>
             <a:ext cx="245135" cy="898426"/>
           </a:xfrm>
           <a:prstGeom prst="straightConnector1">
@@ -11036,7 +12357,7 @@
         </p:nvSpPr>
         <p:spPr>
           <a:xfrm>
-            <a:off x="7720821" y="3835590"/>
+            <a:off x="7349114" y="4136549"/>
             <a:ext cx="684027" cy="215444"/>
           </a:xfrm>
           <a:prstGeom prst="rect">
@@ -11071,7 +12392,7 @@
         </p:nvSpPr>
         <p:spPr>
           <a:xfrm>
-            <a:off x="6352735" y="4070388"/>
+            <a:off x="5981028" y="4371347"/>
             <a:ext cx="2625437" cy="230832"/>
           </a:xfrm>
           <a:prstGeom prst="rect">
@@ -11088,7 +12409,7 @@
             <a:pPr algn="just"/>
             <a:r>
               <a:rPr lang="en-US" sz="900" b="1" dirty="0"/>
-              <a:t>Fig.3 – </a:t>
+              <a:t>Fig.9 – </a:t>
             </a:r>
             <a:r>
               <a:rPr lang="en-US" sz="900" dirty="0"/>
@@ -11097,6 +12418,75 @@
           </a:p>
         </p:txBody>
       </p:sp>
+      <p:sp>
+        <p:nvSpPr>
+          <p:cNvPr id="4" name="TextBox 3">
+            <a:extLst>
+              <a:ext uri="{FF2B5EF4-FFF2-40B4-BE49-F238E27FC236}">
+                <a16:creationId xmlns:a16="http://schemas.microsoft.com/office/drawing/2014/main" id="{D7DD907A-9F95-4A31-33C9-C75364D8D063}"/>
+              </a:ext>
+            </a:extLst>
+          </p:cNvPr>
+          <p:cNvSpPr txBox="1"/>
+          <p:nvPr/>
+        </p:nvSpPr>
+        <p:spPr>
+          <a:xfrm>
+            <a:off x="2242295" y="4698475"/>
+            <a:ext cx="1791263" cy="230832"/>
+          </a:xfrm>
+          <a:prstGeom prst="rect">
+            <a:avLst/>
+          </a:prstGeom>
+          <a:noFill/>
+        </p:spPr>
+        <p:txBody>
+          <a:bodyPr wrap="square">
+            <a:spAutoFit/>
+          </a:bodyPr>
+          <a:lstStyle/>
+          <a:p>
+            <a:pPr algn="just"/>
+            <a:r>
+              <a:rPr lang="en-US" sz="900" b="1" dirty="0"/>
+              <a:t>Fig.8 – </a:t>
+            </a:r>
+            <a:r>
+              <a:rPr lang="en-US" sz="900" dirty="0"/>
+              <a:t>Contour Detection</a:t>
+            </a:r>
+          </a:p>
+        </p:txBody>
+      </p:sp>
+      <p:pic>
+        <p:nvPicPr>
+          <p:cNvPr id="7" name="Picture 6" descr="A child taking a selfie&#10;&#10;Description automatically generated">
+            <a:extLst>
+              <a:ext uri="{FF2B5EF4-FFF2-40B4-BE49-F238E27FC236}">
+                <a16:creationId xmlns:a16="http://schemas.microsoft.com/office/drawing/2014/main" id="{B4A70980-DABD-4C50-B31B-FB3603924DA6}"/>
+              </a:ext>
+            </a:extLst>
+          </p:cNvPr>
+          <p:cNvPicPr>
+            <a:picLocks noChangeAspect="1"/>
+          </p:cNvPicPr>
+          <p:nvPr/>
+        </p:nvPicPr>
+        <p:blipFill rotWithShape="1">
+          <a:blip r:embed="rId4"/>
+          <a:srcRect l="6840"/>
+          <a:stretch/>
+        </p:blipFill>
+        <p:spPr>
+          <a:xfrm>
+            <a:off x="1720215" y="2491205"/>
+            <a:ext cx="2706942" cy="2179258"/>
+          </a:xfrm>
+          <a:prstGeom prst="rect">
+            <a:avLst/>
+          </a:prstGeom>
+        </p:spPr>
+      </p:pic>
     </p:spTree>
     <p:extLst>
       <p:ext uri="{BB962C8B-B14F-4D97-AF65-F5344CB8AC3E}">
@@ -11802,7 +13192,7 @@
 </p:sld>
 </file>
 
-<file path=ppt/slides/slide6.xml><?xml version="1.0" encoding="utf-8"?>
+<file path=ppt/slides/slide8.xml><?xml version="1.0" encoding="utf-8"?>
 <p:sld xmlns:a="http://schemas.openxmlformats.org/drawingml/2006/main" xmlns:r="http://schemas.openxmlformats.org/officeDocument/2006/relationships" xmlns:p="http://schemas.openxmlformats.org/presentationml/2006/main">
   <p:cSld>
     <p:spTree>
@@ -23341,7 +24731,7 @@
 </p:sld>
 </file>
 
-<file path=ppt/slides/slide7.xml><?xml version="1.0" encoding="utf-8"?>
+<file path=ppt/slides/slide9.xml><?xml version="1.0" encoding="utf-8"?>
 <p:sld xmlns:a="http://schemas.openxmlformats.org/drawingml/2006/main" xmlns:r="http://schemas.openxmlformats.org/officeDocument/2006/relationships" xmlns:p="http://schemas.openxmlformats.org/presentationml/2006/main">
   <p:cSld>
     <p:spTree>
@@ -23416,7 +24806,7 @@
         </p:blipFill>
         <p:spPr bwMode="auto">
           <a:xfrm>
-            <a:off x="1700693" y="2915013"/>
+            <a:off x="993743" y="2690841"/>
             <a:ext cx="1366461" cy="1366461"/>
           </a:xfrm>
           <a:prstGeom prst="rect">
@@ -23468,7 +24858,7 @@
             </a:pPr>
             <a:r>
               <a:rPr lang="en-US" sz="1200" dirty="0"/>
-              <a:t>The computer's vision Rubik’s cube solver has been implemented successfully.</a:t>
+              <a:t>The computer's vision Rubik’s cube solver hasn’t been implemented the way we wanted.</a:t>
             </a:r>
           </a:p>
           <a:p>
@@ -23512,7 +24902,7 @@
         </p:blipFill>
         <p:spPr>
           <a:xfrm>
-            <a:off x="3964154" y="2954926"/>
+            <a:off x="2793719" y="3537909"/>
             <a:ext cx="1366461" cy="1321598"/>
           </a:xfrm>
           <a:prstGeom prst="rect">
@@ -23547,8 +24937,74 @@
         </p:blipFill>
         <p:spPr bwMode="auto">
           <a:xfrm>
-            <a:off x="6227615" y="2862538"/>
-            <a:ext cx="1499282" cy="1425444"/>
+            <a:off x="4695213" y="2770150"/>
+            <a:ext cx="1390058" cy="1321599"/>
+          </a:xfrm>
+          <a:prstGeom prst="rect">
+            <a:avLst/>
+          </a:prstGeom>
+          <a:noFill/>
+          <a:extLst>
+            <a:ext uri="{909E8E84-426E-40DD-AFC4-6F175D3DCCD1}">
+              <a14:hiddenFill xmlns:a14="http://schemas.microsoft.com/office/drawing/2010/main">
+                <a:solidFill>
+                  <a:srgbClr val="FFFFFF"/>
+                </a:solidFill>
+              </a14:hiddenFill>
+            </a:ext>
+          </a:extLst>
+        </p:spPr>
+      </p:pic>
+      <p:pic>
+        <p:nvPicPr>
+          <p:cNvPr id="1026" name="Picture 2" descr="JQGO Pyramid Magic Cube, 3 x 3 x 3 Pyraminx Speed Puzzle Cube, Pyramid  Magic Cube for Children Teenagers with PVC Sticker, Easy to Turn:  Amazon.de: Toys">
+            <a:extLst>
+              <a:ext uri="{FF2B5EF4-FFF2-40B4-BE49-F238E27FC236}">
+                <a16:creationId xmlns:a16="http://schemas.microsoft.com/office/drawing/2014/main" id="{C6808A8C-11F2-3E0C-F1DF-199E6C4C051B}"/>
+              </a:ext>
+            </a:extLst>
+          </p:cNvPr>
+          <p:cNvPicPr>
+            <a:picLocks noChangeAspect="1" noChangeArrowheads="1"/>
+          </p:cNvPicPr>
+          <p:nvPr/>
+        </p:nvPicPr>
+        <p:blipFill rotWithShape="1">
+          <a:blip r:embed="rId5">
+            <a:extLst>
+              <a:ext uri="{BEBA8EAE-BF5A-486C-A8C5-ECC9F3942E4B}">
+                <a14:imgProps xmlns:a14="http://schemas.microsoft.com/office/drawing/2010/main">
+                  <a14:imgLayer r:embed="rId6">
+                    <a14:imgEffect>
+                      <a14:backgroundRemoval t="800" b="86900" l="450" r="99213">
+                        <a14:foregroundMark x1="43870" y1="8000" x2="39820" y2="800"/>
+                        <a14:foregroundMark x1="43420" y1="81000" x2="10686" y2="76600"/>
+                        <a14:foregroundMark x1="10686" y1="76600" x2="6299" y2="73000"/>
+                        <a14:foregroundMark x1="34871" y1="83800" x2="16648" y2="82600"/>
+                        <a14:foregroundMark x1="89764" y1="74200" x2="99213" y2="72600"/>
+                        <a14:foregroundMark x1="68391" y1="47200" x2="53206" y2="21900"/>
+                        <a14:foregroundMark x1="37570" y1="21500" x2="20922" y2="58400"/>
+                        <a14:foregroundMark x1="20922" y1="58400" x2="2700" y2="67500"/>
+                        <a14:foregroundMark x1="10349" y1="74200" x2="3150" y2="72600"/>
+                        <a14:foregroundMark x1="4949" y1="69100" x2="562" y2="67500"/>
+                        <a14:foregroundMark x1="37570" y1="86100" x2="24184" y2="86900"/>
+                      </a14:backgroundRemoval>
+                    </a14:imgEffect>
+                  </a14:imgLayer>
+                </a14:imgProps>
+              </a:ext>
+              <a:ext uri="{28A0092B-C50C-407E-A947-70E740481C1C}">
+                <a14:useLocalDpi xmlns:a14="http://schemas.microsoft.com/office/drawing/2010/main" val="0"/>
+              </a:ext>
+            </a:extLst>
+          </a:blip>
+          <a:srcRect b="10687"/>
+          <a:stretch/>
+        </p:blipFill>
+        <p:spPr bwMode="auto">
+          <a:xfrm>
+            <a:off x="6659998" y="3375432"/>
+            <a:ext cx="1474668" cy="1481705"/>
           </a:xfrm>
           <a:prstGeom prst="rect">
             <a:avLst/>

</xml_diff>